<commit_message>
final version tested before 1st bootcamp
</commit_message>
<xml_diff>
--- a/mlu-dlti/Lessons/DEV_MLUDTI-EN-M2-L3.pptx
+++ b/mlu-dlti/Lessons/DEV_MLUDTI-EN-M2-L3.pptx
@@ -362,7 +362,7 @@
           <a:p>
             <a:fld id="{129848E0-960D-4BB4-BB9E-C21D55625BC4}" type="datetimeFigureOut">
               <a:rPr lang="en-US" smtClean="0"/>
-              <a:t>5/9/25</a:t>
+              <a:t>6/3/25</a:t>
             </a:fld>
             <a:endParaRPr lang="en-US" dirty="0"/>
           </a:p>
@@ -8453,7 +8453,7 @@
           <a:p>
             <a:fld id="{3A884B4A-747C-AA41-80CD-0F87274B77BC}" type="datetimeFigureOut">
               <a:rPr lang="en-US" smtClean="0"/>
-              <a:t>5/9/25</a:t>
+              <a:t>6/3/25</a:t>
             </a:fld>
             <a:endParaRPr lang="en-US"/>
           </a:p>
@@ -17063,7 +17063,12 @@
             <p:ph idx="2"/>
           </p:nvPr>
         </p:nvSpPr>
-        <p:spPr/>
+        <p:spPr>
+          <a:xfrm>
+            <a:off x="365760" y="1165536"/>
+            <a:ext cx="8260080" cy="5262696"/>
+          </a:xfrm>
+        </p:spPr>
         <p:txBody>
           <a:bodyPr/>
           <a:lstStyle/>
@@ -25240,7 +25245,7 @@
         </p:nvGraphicFramePr>
         <p:xfrm>
           <a:off x="6418263" y="1465263"/>
-          <a:ext cx="5773737" cy="4572000"/>
+          <a:ext cx="5774025" cy="4572000"/>
         </p:xfrm>
         <a:graphic>
           <a:graphicData uri="http://schemas.openxmlformats.org/drawingml/2006/table">

</xml_diff>